<commit_message>
major updates to the scenarios as requirements sub-article
</commit_message>
<xml_diff>
--- a/images/pictures-for-resizing-or-editing.pptx
+++ b/images/pictures-for-resizing-or-editing.pptx
@@ -7,6 +7,7 @@
   <p:sldIdLst>
     <p:sldId id="257" r:id="rId2"/>
     <p:sldId id="256" r:id="rId3"/>
+    <p:sldId id="258" r:id="rId4"/>
   </p:sldIdLst>
   <p:sldSz cx="12192000" cy="6858000"/>
   <p:notesSz cx="6858000" cy="9144000"/>
@@ -260,7 +261,7 @@
           <a:p>
             <a:fld id="{F098971D-7894-B84F-A3DD-833A5DC3D472}" type="datetimeFigureOut">
               <a:rPr lang="en-US" smtClean="0"/>
-              <a:t>7/13/23</a:t>
+              <a:t>7/25/23</a:t>
             </a:fld>
             <a:endParaRPr lang="en-US"/>
           </a:p>
@@ -458,7 +459,7 @@
           <a:p>
             <a:fld id="{F098971D-7894-B84F-A3DD-833A5DC3D472}" type="datetimeFigureOut">
               <a:rPr lang="en-US" smtClean="0"/>
-              <a:t>7/13/23</a:t>
+              <a:t>7/25/23</a:t>
             </a:fld>
             <a:endParaRPr lang="en-US"/>
           </a:p>
@@ -666,7 +667,7 @@
           <a:p>
             <a:fld id="{F098971D-7894-B84F-A3DD-833A5DC3D472}" type="datetimeFigureOut">
               <a:rPr lang="en-US" smtClean="0"/>
-              <a:t>7/13/23</a:t>
+              <a:t>7/25/23</a:t>
             </a:fld>
             <a:endParaRPr lang="en-US"/>
           </a:p>
@@ -864,7 +865,7 @@
           <a:p>
             <a:fld id="{F098971D-7894-B84F-A3DD-833A5DC3D472}" type="datetimeFigureOut">
               <a:rPr lang="en-US" smtClean="0"/>
-              <a:t>7/13/23</a:t>
+              <a:t>7/25/23</a:t>
             </a:fld>
             <a:endParaRPr lang="en-US"/>
           </a:p>
@@ -1139,7 +1140,7 @@
           <a:p>
             <a:fld id="{F098971D-7894-B84F-A3DD-833A5DC3D472}" type="datetimeFigureOut">
               <a:rPr lang="en-US" smtClean="0"/>
-              <a:t>7/13/23</a:t>
+              <a:t>7/25/23</a:t>
             </a:fld>
             <a:endParaRPr lang="en-US"/>
           </a:p>
@@ -1404,7 +1405,7 @@
           <a:p>
             <a:fld id="{F098971D-7894-B84F-A3DD-833A5DC3D472}" type="datetimeFigureOut">
               <a:rPr lang="en-US" smtClean="0"/>
-              <a:t>7/13/23</a:t>
+              <a:t>7/25/23</a:t>
             </a:fld>
             <a:endParaRPr lang="en-US"/>
           </a:p>
@@ -1816,7 +1817,7 @@
           <a:p>
             <a:fld id="{F098971D-7894-B84F-A3DD-833A5DC3D472}" type="datetimeFigureOut">
               <a:rPr lang="en-US" smtClean="0"/>
-              <a:t>7/13/23</a:t>
+              <a:t>7/25/23</a:t>
             </a:fld>
             <a:endParaRPr lang="en-US"/>
           </a:p>
@@ -1957,7 +1958,7 @@
           <a:p>
             <a:fld id="{F098971D-7894-B84F-A3DD-833A5DC3D472}" type="datetimeFigureOut">
               <a:rPr lang="en-US" smtClean="0"/>
-              <a:t>7/13/23</a:t>
+              <a:t>7/25/23</a:t>
             </a:fld>
             <a:endParaRPr lang="en-US"/>
           </a:p>
@@ -2070,7 +2071,7 @@
           <a:p>
             <a:fld id="{F098971D-7894-B84F-A3DD-833A5DC3D472}" type="datetimeFigureOut">
               <a:rPr lang="en-US" smtClean="0"/>
-              <a:t>7/13/23</a:t>
+              <a:t>7/25/23</a:t>
             </a:fld>
             <a:endParaRPr lang="en-US"/>
           </a:p>
@@ -2381,7 +2382,7 @@
           <a:p>
             <a:fld id="{F098971D-7894-B84F-A3DD-833A5DC3D472}" type="datetimeFigureOut">
               <a:rPr lang="en-US" smtClean="0"/>
-              <a:t>7/13/23</a:t>
+              <a:t>7/25/23</a:t>
             </a:fld>
             <a:endParaRPr lang="en-US"/>
           </a:p>
@@ -2669,7 +2670,7 @@
           <a:p>
             <a:fld id="{F098971D-7894-B84F-A3DD-833A5DC3D472}" type="datetimeFigureOut">
               <a:rPr lang="en-US" smtClean="0"/>
-              <a:t>7/13/23</a:t>
+              <a:t>7/25/23</a:t>
             </a:fld>
             <a:endParaRPr lang="en-US"/>
           </a:p>
@@ -2910,7 +2911,7 @@
           <a:p>
             <a:fld id="{F098971D-7894-B84F-A3DD-833A5DC3D472}" type="datetimeFigureOut">
               <a:rPr lang="en-US" smtClean="0"/>
-              <a:t>7/13/23</a:t>
+              <a:t>7/25/23</a:t>
             </a:fld>
             <a:endParaRPr lang="en-US"/>
           </a:p>
@@ -3650,35 +3651,157 @@
           <a:chExt cx="0" cy="0"/>
         </a:xfrm>
       </p:grpSpPr>
-      <p:sp>
-        <p:nvSpPr>
-          <p:cNvPr id="4" name="Title 3">
-            <a:extLst>
-              <a:ext uri="{FF2B5EF4-FFF2-40B4-BE49-F238E27FC236}">
-                <a16:creationId xmlns:a16="http://schemas.microsoft.com/office/drawing/2014/main" id="{016A7C86-6BB3-5032-D0BF-633FE48A367F}"/>
-              </a:ext>
-            </a:extLst>
-          </p:cNvPr>
-          <p:cNvSpPr>
-            <a:spLocks noGrp="1"/>
-          </p:cNvSpPr>
-          <p:nvPr>
-            <p:ph type="title"/>
-          </p:nvPr>
-        </p:nvSpPr>
-        <p:spPr/>
-        <p:txBody>
-          <a:bodyPr/>
-          <a:lstStyle/>
-          <a:p>
-            <a:endParaRPr lang="en-US"/>
-          </a:p>
-        </p:txBody>
-      </p:sp>
     </p:spTree>
     <p:extLst>
       <p:ext uri="{BB962C8B-B14F-4D97-AF65-F5344CB8AC3E}">
         <p14:creationId xmlns:p14="http://schemas.microsoft.com/office/powerpoint/2010/main" val="814997496"/>
+      </p:ext>
+    </p:extLst>
+  </p:cSld>
+  <p:clrMapOvr>
+    <a:masterClrMapping/>
+  </p:clrMapOvr>
+</p:sld>
+</file>
+
+<file path=ppt/slides/slide3.xml><?xml version="1.0" encoding="utf-8"?>
+<p:sld xmlns:a="http://schemas.openxmlformats.org/drawingml/2006/main" xmlns:r="http://schemas.openxmlformats.org/officeDocument/2006/relationships" xmlns:p="http://schemas.openxmlformats.org/presentationml/2006/main">
+  <p:cSld>
+    <p:spTree>
+      <p:nvGrpSpPr>
+        <p:cNvPr id="1" name=""/>
+        <p:cNvGrpSpPr/>
+        <p:nvPr/>
+      </p:nvGrpSpPr>
+      <p:grpSpPr>
+        <a:xfrm>
+          <a:off x="0" y="0"/>
+          <a:ext cx="0" cy="0"/>
+          <a:chOff x="0" y="0"/>
+          <a:chExt cx="0" cy="0"/>
+        </a:xfrm>
+      </p:grpSpPr>
+      <p:pic>
+        <p:nvPicPr>
+          <p:cNvPr id="7" name="Picture 6" descr="A screenshot of a computer&#10;&#10;Description automatically generated">
+            <a:extLst>
+              <a:ext uri="{FF2B5EF4-FFF2-40B4-BE49-F238E27FC236}">
+                <a16:creationId xmlns:a16="http://schemas.microsoft.com/office/drawing/2014/main" id="{5F22E67C-A47E-7D53-5849-4A34072FA19E}"/>
+              </a:ext>
+            </a:extLst>
+          </p:cNvPr>
+          <p:cNvPicPr>
+            <a:picLocks noChangeAspect="1"/>
+          </p:cNvPicPr>
+          <p:nvPr/>
+        </p:nvPicPr>
+        <p:blipFill rotWithShape="1">
+          <a:blip r:embed="rId2"/>
+          <a:srcRect b="93517"/>
+          <a:stretch/>
+        </p:blipFill>
+        <p:spPr>
+          <a:xfrm>
+            <a:off x="2089324" y="259492"/>
+            <a:ext cx="4035508" cy="234778"/>
+          </a:xfrm>
+          <a:prstGeom prst="rect">
+            <a:avLst/>
+          </a:prstGeom>
+        </p:spPr>
+      </p:pic>
+      <p:pic>
+        <p:nvPicPr>
+          <p:cNvPr id="8" name="Picture 7" descr="A screenshot of a computer&#10;&#10;Description automatically generated">
+            <a:extLst>
+              <a:ext uri="{FF2B5EF4-FFF2-40B4-BE49-F238E27FC236}">
+                <a16:creationId xmlns:a16="http://schemas.microsoft.com/office/drawing/2014/main" id="{E74CEE24-B0A8-CFC2-8812-5035F6279209}"/>
+              </a:ext>
+            </a:extLst>
+          </p:cNvPr>
+          <p:cNvPicPr>
+            <a:picLocks noChangeAspect="1"/>
+          </p:cNvPicPr>
+          <p:nvPr/>
+        </p:nvPicPr>
+        <p:blipFill rotWithShape="1">
+          <a:blip r:embed="rId2"/>
+          <a:srcRect t="15242" b="74180"/>
+          <a:stretch/>
+        </p:blipFill>
+        <p:spPr>
+          <a:xfrm>
+            <a:off x="2089324" y="555367"/>
+            <a:ext cx="4035508" cy="383060"/>
+          </a:xfrm>
+          <a:prstGeom prst="rect">
+            <a:avLst/>
+          </a:prstGeom>
+        </p:spPr>
+      </p:pic>
+      <p:pic>
+        <p:nvPicPr>
+          <p:cNvPr id="9" name="Picture 8" descr="A screenshot of a computer&#10;&#10;Description automatically generated">
+            <a:extLst>
+              <a:ext uri="{FF2B5EF4-FFF2-40B4-BE49-F238E27FC236}">
+                <a16:creationId xmlns:a16="http://schemas.microsoft.com/office/drawing/2014/main" id="{FFF4E440-FDAD-5A3D-6E4A-0D68712A1604}"/>
+              </a:ext>
+            </a:extLst>
+          </p:cNvPr>
+          <p:cNvPicPr>
+            <a:picLocks noChangeAspect="1"/>
+          </p:cNvPicPr>
+          <p:nvPr/>
+        </p:nvPicPr>
+        <p:blipFill rotWithShape="1">
+          <a:blip r:embed="rId2"/>
+          <a:srcRect t="36171"/>
+          <a:stretch/>
+        </p:blipFill>
+        <p:spPr>
+          <a:xfrm>
+            <a:off x="2089324" y="999524"/>
+            <a:ext cx="4035508" cy="2311400"/>
+          </a:xfrm>
+          <a:prstGeom prst="rect">
+            <a:avLst/>
+          </a:prstGeom>
+        </p:spPr>
+      </p:pic>
+      <p:pic>
+        <p:nvPicPr>
+          <p:cNvPr id="10" name="Picture 9">
+            <a:extLst>
+              <a:ext uri="{FF2B5EF4-FFF2-40B4-BE49-F238E27FC236}">
+                <a16:creationId xmlns:a16="http://schemas.microsoft.com/office/drawing/2014/main" id="{F3614065-2915-E8A5-E6F8-5149C967FEC1}"/>
+              </a:ext>
+            </a:extLst>
+          </p:cNvPr>
+          <p:cNvPicPr>
+            <a:picLocks noChangeAspect="1"/>
+          </p:cNvPicPr>
+          <p:nvPr/>
+        </p:nvPicPr>
+        <p:blipFill>
+          <a:blip r:embed="rId3"/>
+          <a:stretch>
+            <a:fillRect/>
+          </a:stretch>
+        </p:blipFill>
+        <p:spPr>
+          <a:xfrm>
+            <a:off x="2089324" y="3567986"/>
+            <a:ext cx="4035508" cy="2332309"/>
+          </a:xfrm>
+          <a:prstGeom prst="rect">
+            <a:avLst/>
+          </a:prstGeom>
+        </p:spPr>
+      </p:pic>
+    </p:spTree>
+    <p:extLst>
+      <p:ext uri="{BB962C8B-B14F-4D97-AF65-F5344CB8AC3E}">
+        <p14:creationId xmlns:p14="http://schemas.microsoft.com/office/powerpoint/2010/main" val="922193543"/>
       </p:ext>
     </p:extLst>
   </p:cSld>

</xml_diff>

<commit_message>
adds based on Markus feedback
</commit_message>
<xml_diff>
--- a/images/pictures-for-resizing-or-editing.pptx
+++ b/images/pictures-for-resizing-or-editing.pptx
@@ -261,7 +261,7 @@
           <a:p>
             <a:fld id="{F098971D-7894-B84F-A3DD-833A5DC3D472}" type="datetimeFigureOut">
               <a:rPr lang="en-US" smtClean="0"/>
-              <a:t>7/25/23</a:t>
+              <a:t>7/26/23</a:t>
             </a:fld>
             <a:endParaRPr lang="en-US"/>
           </a:p>
@@ -459,7 +459,7 @@
           <a:p>
             <a:fld id="{F098971D-7894-B84F-A3DD-833A5DC3D472}" type="datetimeFigureOut">
               <a:rPr lang="en-US" smtClean="0"/>
-              <a:t>7/25/23</a:t>
+              <a:t>7/26/23</a:t>
             </a:fld>
             <a:endParaRPr lang="en-US"/>
           </a:p>
@@ -667,7 +667,7 @@
           <a:p>
             <a:fld id="{F098971D-7894-B84F-A3DD-833A5DC3D472}" type="datetimeFigureOut">
               <a:rPr lang="en-US" smtClean="0"/>
-              <a:t>7/25/23</a:t>
+              <a:t>7/26/23</a:t>
             </a:fld>
             <a:endParaRPr lang="en-US"/>
           </a:p>
@@ -865,7 +865,7 @@
           <a:p>
             <a:fld id="{F098971D-7894-B84F-A3DD-833A5DC3D472}" type="datetimeFigureOut">
               <a:rPr lang="en-US" smtClean="0"/>
-              <a:t>7/25/23</a:t>
+              <a:t>7/26/23</a:t>
             </a:fld>
             <a:endParaRPr lang="en-US"/>
           </a:p>
@@ -1140,7 +1140,7 @@
           <a:p>
             <a:fld id="{F098971D-7894-B84F-A3DD-833A5DC3D472}" type="datetimeFigureOut">
               <a:rPr lang="en-US" smtClean="0"/>
-              <a:t>7/25/23</a:t>
+              <a:t>7/26/23</a:t>
             </a:fld>
             <a:endParaRPr lang="en-US"/>
           </a:p>
@@ -1405,7 +1405,7 @@
           <a:p>
             <a:fld id="{F098971D-7894-B84F-A3DD-833A5DC3D472}" type="datetimeFigureOut">
               <a:rPr lang="en-US" smtClean="0"/>
-              <a:t>7/25/23</a:t>
+              <a:t>7/26/23</a:t>
             </a:fld>
             <a:endParaRPr lang="en-US"/>
           </a:p>
@@ -1817,7 +1817,7 @@
           <a:p>
             <a:fld id="{F098971D-7894-B84F-A3DD-833A5DC3D472}" type="datetimeFigureOut">
               <a:rPr lang="en-US" smtClean="0"/>
-              <a:t>7/25/23</a:t>
+              <a:t>7/26/23</a:t>
             </a:fld>
             <a:endParaRPr lang="en-US"/>
           </a:p>
@@ -1958,7 +1958,7 @@
           <a:p>
             <a:fld id="{F098971D-7894-B84F-A3DD-833A5DC3D472}" type="datetimeFigureOut">
               <a:rPr lang="en-US" smtClean="0"/>
-              <a:t>7/25/23</a:t>
+              <a:t>7/26/23</a:t>
             </a:fld>
             <a:endParaRPr lang="en-US"/>
           </a:p>
@@ -2071,7 +2071,7 @@
           <a:p>
             <a:fld id="{F098971D-7894-B84F-A3DD-833A5DC3D472}" type="datetimeFigureOut">
               <a:rPr lang="en-US" smtClean="0"/>
-              <a:t>7/25/23</a:t>
+              <a:t>7/26/23</a:t>
             </a:fld>
             <a:endParaRPr lang="en-US"/>
           </a:p>
@@ -2382,7 +2382,7 @@
           <a:p>
             <a:fld id="{F098971D-7894-B84F-A3DD-833A5DC3D472}" type="datetimeFigureOut">
               <a:rPr lang="en-US" smtClean="0"/>
-              <a:t>7/25/23</a:t>
+              <a:t>7/26/23</a:t>
             </a:fld>
             <a:endParaRPr lang="en-US"/>
           </a:p>
@@ -2670,7 +2670,7 @@
           <a:p>
             <a:fld id="{F098971D-7894-B84F-A3DD-833A5DC3D472}" type="datetimeFigureOut">
               <a:rPr lang="en-US" smtClean="0"/>
-              <a:t>7/25/23</a:t>
+              <a:t>7/26/23</a:t>
             </a:fld>
             <a:endParaRPr lang="en-US"/>
           </a:p>
@@ -2911,7 +2911,7 @@
           <a:p>
             <a:fld id="{F098971D-7894-B84F-A3DD-833A5DC3D472}" type="datetimeFigureOut">
               <a:rPr lang="en-US" smtClean="0"/>
-              <a:t>7/25/23</a:t>
+              <a:t>7/26/23</a:t>
             </a:fld>
             <a:endParaRPr lang="en-US"/>
           </a:p>
@@ -3651,6 +3651,157 @@
           <a:chExt cx="0" cy="0"/>
         </a:xfrm>
       </p:grpSpPr>
+      <p:sp>
+        <p:nvSpPr>
+          <p:cNvPr id="2" name="Rectangle 2">
+            <a:extLst>
+              <a:ext uri="{FF2B5EF4-FFF2-40B4-BE49-F238E27FC236}">
+                <a16:creationId xmlns:a16="http://schemas.microsoft.com/office/drawing/2014/main" id="{5E087EBA-CE3D-A3AF-978A-723485BF9E8D}"/>
+              </a:ext>
+            </a:extLst>
+          </p:cNvPr>
+          <p:cNvSpPr>
+            <a:spLocks noChangeArrowheads="1"/>
+          </p:cNvSpPr>
+          <p:nvPr/>
+        </p:nvSpPr>
+        <p:spPr bwMode="auto">
+          <a:xfrm>
+            <a:off x="1361661" y="427383"/>
+            <a:ext cx="12192000" cy="0"/>
+          </a:xfrm>
+          <a:prstGeom prst="rect">
+            <a:avLst/>
+          </a:prstGeom>
+          <a:noFill/>
+          <a:ln>
+            <a:noFill/>
+          </a:ln>
+          <a:effectLst/>
+          <a:extLst>
+            <a:ext uri="{909E8E84-426E-40DD-AFC4-6F175D3DCCD1}">
+              <a14:hiddenFill xmlns:a14="http://schemas.microsoft.com/office/drawing/2010/main">
+                <a:solidFill>
+                  <a:schemeClr val="accent1"/>
+                </a:solidFill>
+              </a14:hiddenFill>
+            </a:ext>
+            <a:ext uri="{91240B29-F687-4F45-9708-019B960494DF}">
+              <a14:hiddenLine xmlns:a14="http://schemas.microsoft.com/office/drawing/2010/main" w="9525">
+                <a:solidFill>
+                  <a:schemeClr val="tx1"/>
+                </a:solidFill>
+                <a:miter lim="800000"/>
+                <a:headEnd/>
+                <a:tailEnd/>
+              </a14:hiddenLine>
+            </a:ext>
+            <a:ext uri="{AF507438-7753-43E0-B8FC-AC1667EBCBE1}">
+              <a14:hiddenEffects xmlns:a14="http://schemas.microsoft.com/office/drawing/2010/main">
+                <a:effectLst>
+                  <a:outerShdw dist="35921" dir="2700000" algn="ctr" rotWithShape="0">
+                    <a:schemeClr val="bg2"/>
+                  </a:outerShdw>
+                </a:effectLst>
+              </a14:hiddenEffects>
+            </a:ext>
+          </a:extLst>
+        </p:spPr>
+        <p:txBody>
+          <a:bodyPr vert="horz" wrap="none" lIns="91440" tIns="45720" rIns="91440" bIns="45720" numCol="1" anchor="ctr" anchorCtr="0" compatLnSpc="1">
+            <a:prstTxWarp prst="textNoShape">
+              <a:avLst/>
+            </a:prstTxWarp>
+            <a:spAutoFit/>
+          </a:bodyPr>
+          <a:lstStyle/>
+          <a:p>
+            <a:endParaRPr lang="en-US"/>
+          </a:p>
+        </p:txBody>
+      </p:sp>
+      <p:graphicFrame>
+        <p:nvGraphicFramePr>
+          <p:cNvPr id="3" name="Object 2">
+            <a:extLst>
+              <a:ext uri="{FF2B5EF4-FFF2-40B4-BE49-F238E27FC236}">
+                <a16:creationId xmlns:a16="http://schemas.microsoft.com/office/drawing/2014/main" id="{EE2839C2-FE8F-C99A-095F-83646554A635}"/>
+              </a:ext>
+            </a:extLst>
+          </p:cNvPr>
+          <p:cNvGraphicFramePr>
+            <a:graphicFrameLocks noChangeAspect="1"/>
+          </p:cNvGraphicFramePr>
+          <p:nvPr>
+            <p:extLst>
+              <p:ext uri="{D42A27DB-BD31-4B8C-83A1-F6EECF244321}">
+                <p14:modId xmlns:p14="http://schemas.microsoft.com/office/powerpoint/2010/main" val="614631553"/>
+              </p:ext>
+            </p:extLst>
+          </p:nvPr>
+        </p:nvGraphicFramePr>
+        <p:xfrm>
+          <a:off x="1361661" y="427383"/>
+          <a:ext cx="5473700" cy="5346700"/>
+        </p:xfrm>
+        <a:graphic>
+          <a:graphicData uri="http://schemas.openxmlformats.org/presentationml/2006/ole">
+            <mc:AlternateContent xmlns:mc="http://schemas.openxmlformats.org/markup-compatibility/2006">
+              <mc:Choice xmlns:v="urn:schemas-microsoft-com:vml" Requires="v">
+                <p:oleObj r:id="rId2" imgW="4991100" imgH="4292600" progId="Visio.Drawing.11">
+                  <p:embed/>
+                </p:oleObj>
+              </mc:Choice>
+              <mc:Fallback>
+                <p:oleObj r:id="rId2" imgW="4991100" imgH="4292600" progId="Visio.Drawing.11">
+                  <p:embed/>
+                  <p:pic>
+                    <p:nvPicPr>
+                      <p:cNvPr id="0" name="Object 1"/>
+                      <p:cNvPicPr>
+                        <a:picLocks noChangeAspect="1" noChangeArrowheads="1"/>
+                      </p:cNvPicPr>
+                      <p:nvPr/>
+                    </p:nvPicPr>
+                    <p:blipFill>
+                      <a:blip r:embed="rId3">
+                        <a:extLst>
+                          <a:ext uri="{28A0092B-C50C-407E-A947-70E740481C1C}">
+                            <a14:useLocalDpi xmlns:a14="http://schemas.microsoft.com/office/drawing/2010/main" val="0"/>
+                          </a:ext>
+                        </a:extLst>
+                      </a:blip>
+                      <a:srcRect l="11671"/>
+                      <a:stretch>
+                        <a:fillRect/>
+                      </a:stretch>
+                    </p:blipFill>
+                    <p:spPr bwMode="auto">
+                      <a:xfrm>
+                        <a:off x="1361661" y="427383"/>
+                        <a:ext cx="5473700" cy="5346700"/>
+                      </a:xfrm>
+                      <a:prstGeom prst="rect">
+                        <a:avLst/>
+                      </a:prstGeom>
+                      <a:noFill/>
+                      <a:extLst>
+                        <a:ext uri="{909E8E84-426E-40DD-AFC4-6F175D3DCCD1}">
+                          <a14:hiddenFill xmlns:a14="http://schemas.microsoft.com/office/drawing/2010/main">
+                            <a:solidFill>
+                              <a:srgbClr val="FFFFFF"/>
+                            </a:solidFill>
+                          </a14:hiddenFill>
+                        </a:ext>
+                      </a:extLst>
+                    </p:spPr>
+                  </p:pic>
+                </p:oleObj>
+              </mc:Fallback>
+            </mc:AlternateContent>
+          </a:graphicData>
+        </a:graphic>
+      </p:graphicFrame>
     </p:spTree>
     <p:extLst>
       <p:ext uri="{BB962C8B-B14F-4D97-AF65-F5344CB8AC3E}">

</xml_diff>

<commit_message>
update intro based on feedback from markus
</commit_message>
<xml_diff>
--- a/images/pictures-for-resizing-or-editing.pptx
+++ b/images/pictures-for-resizing-or-editing.pptx
@@ -7,7 +7,8 @@
   <p:sldIdLst>
     <p:sldId id="257" r:id="rId2"/>
     <p:sldId id="256" r:id="rId3"/>
-    <p:sldId id="258" r:id="rId4"/>
+    <p:sldId id="259" r:id="rId4"/>
+    <p:sldId id="258" r:id="rId5"/>
   </p:sldIdLst>
   <p:sldSz cx="12192000" cy="6858000"/>
   <p:notesSz cx="6858000" cy="9144000"/>
@@ -3816,6 +3817,66 @@
 </file>
 
 <file path=ppt/slides/slide3.xml><?xml version="1.0" encoding="utf-8"?>
+<p:sld xmlns:a="http://schemas.openxmlformats.org/drawingml/2006/main" xmlns:r="http://schemas.openxmlformats.org/officeDocument/2006/relationships" xmlns:p="http://schemas.openxmlformats.org/presentationml/2006/main">
+  <p:cSld>
+    <p:spTree>
+      <p:nvGrpSpPr>
+        <p:cNvPr id="1" name=""/>
+        <p:cNvGrpSpPr/>
+        <p:nvPr/>
+      </p:nvGrpSpPr>
+      <p:grpSpPr>
+        <a:xfrm>
+          <a:off x="0" y="0"/>
+          <a:ext cx="0" cy="0"/>
+          <a:chOff x="0" y="0"/>
+          <a:chExt cx="0" cy="0"/>
+        </a:xfrm>
+      </p:grpSpPr>
+      <p:pic>
+        <p:nvPicPr>
+          <p:cNvPr id="4" name="Picture 3">
+            <a:extLst>
+              <a:ext uri="{FF2B5EF4-FFF2-40B4-BE49-F238E27FC236}">
+                <a16:creationId xmlns:a16="http://schemas.microsoft.com/office/drawing/2014/main" id="{FF51CE5A-5DDC-4843-D84B-76595BA87BA0}"/>
+              </a:ext>
+            </a:extLst>
+          </p:cNvPr>
+          <p:cNvPicPr>
+            <a:picLocks noChangeAspect="1"/>
+          </p:cNvPicPr>
+          <p:nvPr/>
+        </p:nvPicPr>
+        <p:blipFill>
+          <a:blip r:embed="rId2"/>
+          <a:stretch>
+            <a:fillRect/>
+          </a:stretch>
+        </p:blipFill>
+        <p:spPr>
+          <a:xfrm>
+            <a:off x="532886" y="384432"/>
+            <a:ext cx="1562100" cy="2184400"/>
+          </a:xfrm>
+          <a:prstGeom prst="rect">
+            <a:avLst/>
+          </a:prstGeom>
+        </p:spPr>
+      </p:pic>
+    </p:spTree>
+    <p:extLst>
+      <p:ext uri="{BB962C8B-B14F-4D97-AF65-F5344CB8AC3E}">
+        <p14:creationId xmlns:p14="http://schemas.microsoft.com/office/powerpoint/2010/main" val="724554610"/>
+      </p:ext>
+    </p:extLst>
+  </p:cSld>
+  <p:clrMapOvr>
+    <a:masterClrMapping/>
+  </p:clrMapOvr>
+</p:sld>
+</file>
+
+<file path=ppt/slides/slide4.xml><?xml version="1.0" encoding="utf-8"?>
 <p:sld xmlns:a="http://schemas.openxmlformats.org/drawingml/2006/main" xmlns:r="http://schemas.openxmlformats.org/officeDocument/2006/relationships" xmlns:p="http://schemas.openxmlformats.org/presentationml/2006/main">
   <p:cSld>
     <p:spTree>

</xml_diff>